<commit_message>
fixing slide 04 with minor touch up fixing slide 09 because inherit_from is missing underscore
</commit_message>
<xml_diff>
--- a/09-rubocop.pptx
+++ b/09-rubocop.pptx
@@ -229,7 +229,7 @@
           <a:p>
             <a:fld id="{6C8008D8-2F79-E542-BF75-A622FCA35A75}" type="datetimeFigureOut">
               <a:rPr lang="en-US" smtClean="0"/>
-              <a:t>7/24/2015</a:t>
+              <a:t>9/15/16</a:t>
             </a:fld>
             <a:endParaRPr lang="en-US" dirty="0"/>
           </a:p>
@@ -1821,7 +1821,7 @@
           <a:p>
             <a:fld id="{1D8BD707-D9CF-40AE-B4C6-C98DA3205C09}" type="datetimeFigureOut">
               <a:rPr lang="en-US"/>
-              <a:t>7/24/2015</a:t>
+              <a:t>9/15/16</a:t>
             </a:fld>
             <a:endParaRPr lang="en-US" dirty="0"/>
           </a:p>
@@ -2006,7 +2006,7 @@
           <a:p>
             <a:fld id="{1D8BD707-D9CF-40AE-B4C6-C98DA3205C09}" type="datetimeFigureOut">
               <a:rPr lang="en-US"/>
-              <a:t>7/24/2015</a:t>
+              <a:t>9/15/16</a:t>
             </a:fld>
             <a:endParaRPr lang="en-US" dirty="0"/>
           </a:p>
@@ -5374,7 +5374,7 @@
           <a:p>
             <a:fld id="{1D8BD707-D9CF-40AE-B4C6-C98DA3205C09}" type="datetimeFigureOut">
               <a:rPr lang="en-US"/>
-              <a:t>7/24/2015</a:t>
+              <a:t>9/15/16</a:t>
             </a:fld>
             <a:endParaRPr lang="en-US" dirty="0"/>
           </a:p>
@@ -5528,7 +5528,7 @@
           <a:p>
             <a:fld id="{1D8BD707-D9CF-40AE-B4C6-C98DA3205C09}" type="datetimeFigureOut">
               <a:rPr lang="en-US"/>
-              <a:t>7/24/2015</a:t>
+              <a:t>9/15/16</a:t>
             </a:fld>
             <a:endParaRPr lang="en-US" dirty="0"/>
           </a:p>
@@ -8701,7 +8701,7 @@
           <a:p>
             <a:fld id="{1D8BD707-D9CF-40AE-B4C6-C98DA3205C09}" type="datetimeFigureOut">
               <a:rPr lang="en-US"/>
-              <a:t>7/24/2015</a:t>
+              <a:t>9/15/16</a:t>
             </a:fld>
             <a:endParaRPr lang="en-US" dirty="0"/>
           </a:p>
@@ -9539,7 +9539,7 @@
           <a:p>
             <a:fld id="{1D8BD707-D9CF-40AE-B4C6-C98DA3205C09}" type="datetimeFigureOut">
               <a:rPr lang="en-US"/>
-              <a:t>7/24/2015</a:t>
+              <a:t>9/15/16</a:t>
             </a:fld>
             <a:endParaRPr lang="en-US" dirty="0"/>
           </a:p>
@@ -20454,7 +20454,7 @@
           </a:ln>
           <a:extLst>
             <a:ext uri="{C572A759-6A51-4108-AA02-DFA0A04FC94B}">
-              <ma14:wrappingTextBoxFlag xmlns="" xmlns:ma14="http://schemas.microsoft.com/office/mac/drawingml/2011/main" val="1"/>
+              <ma14:wrappingTextBoxFlag xmlns:ma14="http://schemas.microsoft.com/office/mac/drawingml/2011/main" val="1"/>
             </a:ext>
           </a:extLst>
         </p:spPr>
@@ -20502,7 +20502,7 @@
           </a:ln>
           <a:extLst>
             <a:ext uri="{C572A759-6A51-4108-AA02-DFA0A04FC94B}">
-              <ma14:wrappingTextBoxFlag xmlns="" xmlns:ma14="http://schemas.microsoft.com/office/mac/drawingml/2011/main" val="1"/>
+              <ma14:wrappingTextBoxFlag xmlns:ma14="http://schemas.microsoft.com/office/mac/drawingml/2011/main" val="1"/>
             </a:ext>
           </a:extLst>
         </p:spPr>
@@ -20559,7 +20559,7 @@
           </a:ln>
           <a:extLst>
             <a:ext uri="{C572A759-6A51-4108-AA02-DFA0A04FC94B}">
-              <ma14:wrappingTextBoxFlag xmlns="" xmlns:ma14="http://schemas.microsoft.com/office/mac/drawingml/2011/main" val="1"/>
+              <ma14:wrappingTextBoxFlag xmlns:ma14="http://schemas.microsoft.com/office/mac/drawingml/2011/main" val="1"/>
             </a:ext>
           </a:extLst>
         </p:spPr>
@@ -20885,7 +20885,7 @@
           </a:ln>
           <a:extLst>
             <a:ext uri="{C572A759-6A51-4108-AA02-DFA0A04FC94B}">
-              <ma14:wrappingTextBoxFlag xmlns="" xmlns:ma14="http://schemas.microsoft.com/office/mac/drawingml/2011/main" val="1"/>
+              <ma14:wrappingTextBoxFlag xmlns:ma14="http://schemas.microsoft.com/office/mac/drawingml/2011/main" val="1"/>
             </a:ext>
           </a:extLst>
         </p:spPr>
@@ -20933,7 +20933,7 @@
           </a:ln>
           <a:extLst>
             <a:ext uri="{C572A759-6A51-4108-AA02-DFA0A04FC94B}">
-              <ma14:wrappingTextBoxFlag xmlns="" xmlns:ma14="http://schemas.microsoft.com/office/mac/drawingml/2011/main" val="1"/>
+              <ma14:wrappingTextBoxFlag xmlns:ma14="http://schemas.microsoft.com/office/mac/drawingml/2011/main" val="1"/>
             </a:ext>
           </a:extLst>
         </p:spPr>
@@ -20981,7 +20981,7 @@
           </a:ln>
           <a:extLst>
             <a:ext uri="{C572A759-6A51-4108-AA02-DFA0A04FC94B}">
-              <ma14:wrappingTextBoxFlag xmlns="" xmlns:ma14="http://schemas.microsoft.com/office/mac/drawingml/2011/main" val="1"/>
+              <ma14:wrappingTextBoxFlag xmlns:ma14="http://schemas.microsoft.com/office/mac/drawingml/2011/main" val="1"/>
             </a:ext>
           </a:extLst>
         </p:spPr>
@@ -21038,7 +21038,7 @@
           </a:ln>
           <a:extLst>
             <a:ext uri="{C572A759-6A51-4108-AA02-DFA0A04FC94B}">
-              <ma14:wrappingTextBoxFlag xmlns="" xmlns:ma14="http://schemas.microsoft.com/office/mac/drawingml/2011/main" val="1"/>
+              <ma14:wrappingTextBoxFlag xmlns:ma14="http://schemas.microsoft.com/office/mac/drawingml/2011/main" val="1"/>
             </a:ext>
           </a:extLst>
         </p:spPr>
@@ -21061,8 +21061,8 @@
               <a:defRPr sz="1800"/>
             </a:pPr>
             <a:r>
-              <a:rPr lang="en-US" sz="3200" dirty="0" smtClean="0"/>
-              <a:t>inherit from</a:t>
+              <a:rPr lang="en-US" sz="3200" dirty="0" err="1" smtClean="0"/>
+              <a:t>Inherit_from</a:t>
             </a:r>
             <a:r>
               <a:rPr sz="3200" dirty="0" smtClean="0"/>
@@ -21181,7 +21181,7 @@
           </a:ln>
           <a:extLst>
             <a:ext uri="{C572A759-6A51-4108-AA02-DFA0A04FC94B}">
-              <ma14:wrappingTextBoxFlag xmlns="" xmlns:ma14="http://schemas.microsoft.com/office/mac/drawingml/2011/main" val="1"/>
+              <ma14:wrappingTextBoxFlag xmlns:ma14="http://schemas.microsoft.com/office/mac/drawingml/2011/main" val="1"/>
             </a:ext>
           </a:extLst>
         </p:spPr>
@@ -21296,7 +21296,7 @@
           </a:ln>
           <a:extLst>
             <a:ext uri="{C572A759-6A51-4108-AA02-DFA0A04FC94B}">
-              <ma14:wrappingTextBoxFlag xmlns="" xmlns:ma14="http://schemas.microsoft.com/office/mac/drawingml/2011/main" val="1"/>
+              <ma14:wrappingTextBoxFlag xmlns:ma14="http://schemas.microsoft.com/office/mac/drawingml/2011/main" val="1"/>
             </a:ext>
           </a:extLst>
         </p:spPr>
@@ -21456,7 +21456,7 @@
           </a:ln>
           <a:extLst>
             <a:ext uri="{C572A759-6A51-4108-AA02-DFA0A04FC94B}">
-              <ma14:wrappingTextBoxFlag xmlns="" xmlns:ma14="http://schemas.microsoft.com/office/mac/drawingml/2011/main" val="1"/>
+              <ma14:wrappingTextBoxFlag xmlns:ma14="http://schemas.microsoft.com/office/mac/drawingml/2011/main" val="1"/>
             </a:ext>
           </a:extLst>
         </p:spPr>
@@ -21684,7 +21684,7 @@
           </a:ln>
           <a:extLst>
             <a:ext uri="{C572A759-6A51-4108-AA02-DFA0A04FC94B}">
-              <ma14:wrappingTextBoxFlag xmlns="" xmlns:ma14="http://schemas.microsoft.com/office/mac/drawingml/2011/main" val="1"/>
+              <ma14:wrappingTextBoxFlag xmlns:ma14="http://schemas.microsoft.com/office/mac/drawingml/2011/main" val="1"/>
             </a:ext>
           </a:extLst>
         </p:spPr>
@@ -21732,7 +21732,7 @@
           </a:ln>
           <a:extLst>
             <a:ext uri="{C572A759-6A51-4108-AA02-DFA0A04FC94B}">
-              <ma14:wrappingTextBoxFlag xmlns="" xmlns:ma14="http://schemas.microsoft.com/office/mac/drawingml/2011/main" val="1"/>
+              <ma14:wrappingTextBoxFlag xmlns:ma14="http://schemas.microsoft.com/office/mac/drawingml/2011/main" val="1"/>
             </a:ext>
           </a:extLst>
         </p:spPr>
@@ -21789,7 +21789,7 @@
           </a:ln>
           <a:extLst>
             <a:ext uri="{C572A759-6A51-4108-AA02-DFA0A04FC94B}">
-              <ma14:wrappingTextBoxFlag xmlns="" xmlns:ma14="http://schemas.microsoft.com/office/mac/drawingml/2011/main" val="1"/>
+              <ma14:wrappingTextBoxFlag xmlns:ma14="http://schemas.microsoft.com/office/mac/drawingml/2011/main" val="1"/>
             </a:ext>
           </a:extLst>
         </p:spPr>
@@ -21824,7 +21824,7 @@
                 <a:cs typeface="Courier"/>
                 <a:sym typeface="Courier"/>
               </a:rPr>
-              <a:t>inherit from</a:t>
+              <a:t>inherit_from</a:t>
             </a:r>
             <a:r>
               <a:rPr sz="2800" dirty="0" smtClean="0">
@@ -22145,7 +22145,7 @@
           </a:ln>
           <a:extLst>
             <a:ext uri="{C572A759-6A51-4108-AA02-DFA0A04FC94B}">
-              <ma14:wrappingTextBoxFlag xmlns="" xmlns:ma14="http://schemas.microsoft.com/office/mac/drawingml/2011/main" val="1"/>
+              <ma14:wrappingTextBoxFlag xmlns:ma14="http://schemas.microsoft.com/office/mac/drawingml/2011/main" val="1"/>
             </a:ext>
           </a:extLst>
         </p:spPr>
@@ -22231,7 +22231,7 @@
           </a:ln>
           <a:extLst>
             <a:ext uri="{C572A759-6A51-4108-AA02-DFA0A04FC94B}">
-              <ma14:wrappingTextBoxFlag xmlns="" xmlns:ma14="http://schemas.microsoft.com/office/mac/drawingml/2011/main" val="1"/>
+              <ma14:wrappingTextBoxFlag xmlns:ma14="http://schemas.microsoft.com/office/mac/drawingml/2011/main" val="1"/>
             </a:ext>
           </a:extLst>
         </p:spPr>
@@ -22358,7 +22358,7 @@
           </a:ln>
           <a:extLst>
             <a:ext uri="{C572A759-6A51-4108-AA02-DFA0A04FC94B}">
-              <ma14:wrappingTextBoxFlag xmlns="" xmlns:ma14="http://schemas.microsoft.com/office/mac/drawingml/2011/main" val="1"/>
+              <ma14:wrappingTextBoxFlag xmlns:ma14="http://schemas.microsoft.com/office/mac/drawingml/2011/main" val="1"/>
             </a:ext>
           </a:extLst>
         </p:spPr>
@@ -22730,7 +22730,7 @@
           </a:ln>
           <a:extLst>
             <a:ext uri="{C572A759-6A51-4108-AA02-DFA0A04FC94B}">
-              <ma14:wrappingTextBoxFlag xmlns="" xmlns:ma14="http://schemas.microsoft.com/office/mac/drawingml/2011/main" val="1"/>
+              <ma14:wrappingTextBoxFlag xmlns:ma14="http://schemas.microsoft.com/office/mac/drawingml/2011/main" val="1"/>
             </a:ext>
           </a:extLst>
         </p:spPr>
@@ -22767,7 +22767,7 @@
               <a:defRPr sz="1800"/>
             </a:pPr>
             <a:r>
-              <a:rPr sz="4400" dirty="0">
+              <a:rPr sz="4400">
                 <a:latin typeface="Arial" panose="020B0604020202020204" pitchFamily="34" charset="0"/>
                 <a:cs typeface="Arial" panose="020B0604020202020204" pitchFamily="34" charset="0"/>
                 <a:sym typeface="Arial"/>
@@ -22775,13 +22775,13 @@
               <a:t>Add </a:t>
             </a:r>
             <a:r>
-              <a:rPr lang="en-US" sz="4400" dirty="0" smtClean="0">
+              <a:rPr lang="en-US" sz="4400" smtClean="0">
                 <a:latin typeface="Courier New" panose="02070309020205020404" pitchFamily="49" charset="0"/>
                 <a:ea typeface="Courier"/>
                 <a:cs typeface="Courier New" panose="02070309020205020404" pitchFamily="49" charset="0"/>
                 <a:sym typeface="Courier"/>
               </a:rPr>
-              <a:t>inherit from</a:t>
+              <a:t>inherit_from</a:t>
             </a:r>
             <a:r>
               <a:rPr sz="4400" dirty="0" smtClean="0">
@@ -23034,7 +23034,7 @@
           </a:ln>
           <a:extLst>
             <a:ext uri="{C572A759-6A51-4108-AA02-DFA0A04FC94B}">
-              <ma14:wrappingTextBoxFlag xmlns="" xmlns:ma14="http://schemas.microsoft.com/office/mac/drawingml/2011/main" val="1"/>
+              <ma14:wrappingTextBoxFlag xmlns:ma14="http://schemas.microsoft.com/office/mac/drawingml/2011/main" val="1"/>
             </a:ext>
           </a:extLst>
         </p:spPr>
@@ -23082,7 +23082,7 @@
           </a:ln>
           <a:extLst>
             <a:ext uri="{C572A759-6A51-4108-AA02-DFA0A04FC94B}">
-              <ma14:wrappingTextBoxFlag xmlns="" xmlns:ma14="http://schemas.microsoft.com/office/mac/drawingml/2011/main" val="1"/>
+              <ma14:wrappingTextBoxFlag xmlns:ma14="http://schemas.microsoft.com/office/mac/drawingml/2011/main" val="1"/>
             </a:ext>
           </a:extLst>
         </p:spPr>
@@ -23130,7 +23130,7 @@
           </a:ln>
           <a:extLst>
             <a:ext uri="{C572A759-6A51-4108-AA02-DFA0A04FC94B}">
-              <ma14:wrappingTextBoxFlag xmlns="" xmlns:ma14="http://schemas.microsoft.com/office/mac/drawingml/2011/main" val="1"/>
+              <ma14:wrappingTextBoxFlag xmlns:ma14="http://schemas.microsoft.com/office/mac/drawingml/2011/main" val="1"/>
             </a:ext>
           </a:extLst>
         </p:spPr>
@@ -23187,7 +23187,7 @@
           </a:ln>
           <a:extLst>
             <a:ext uri="{C572A759-6A51-4108-AA02-DFA0A04FC94B}">
-              <ma14:wrappingTextBoxFlag xmlns="" xmlns:ma14="http://schemas.microsoft.com/office/mac/drawingml/2011/main" val="1"/>
+              <ma14:wrappingTextBoxFlag xmlns:ma14="http://schemas.microsoft.com/office/mac/drawingml/2011/main" val="1"/>
             </a:ext>
           </a:extLst>
         </p:spPr>
@@ -23518,7 +23518,7 @@
           </a:ln>
           <a:extLst>
             <a:ext uri="{C572A759-6A51-4108-AA02-DFA0A04FC94B}">
-              <ma14:wrappingTextBoxFlag xmlns="" xmlns:ma14="http://schemas.microsoft.com/office/mac/drawingml/2011/main" val="1"/>
+              <ma14:wrappingTextBoxFlag xmlns:ma14="http://schemas.microsoft.com/office/mac/drawingml/2011/main" val="1"/>
             </a:ext>
           </a:extLst>
         </p:spPr>
@@ -23566,7 +23566,7 @@
           </a:ln>
           <a:extLst>
             <a:ext uri="{C572A759-6A51-4108-AA02-DFA0A04FC94B}">
-              <ma14:wrappingTextBoxFlag xmlns="" xmlns:ma14="http://schemas.microsoft.com/office/mac/drawingml/2011/main" val="1"/>
+              <ma14:wrappingTextBoxFlag xmlns:ma14="http://schemas.microsoft.com/office/mac/drawingml/2011/main" val="1"/>
             </a:ext>
           </a:extLst>
         </p:spPr>
@@ -23623,7 +23623,7 @@
           </a:ln>
           <a:extLst>
             <a:ext uri="{C572A759-6A51-4108-AA02-DFA0A04FC94B}">
-              <ma14:wrappingTextBoxFlag xmlns="" xmlns:ma14="http://schemas.microsoft.com/office/mac/drawingml/2011/main" val="1"/>
+              <ma14:wrappingTextBoxFlag xmlns:ma14="http://schemas.microsoft.com/office/mac/drawingml/2011/main" val="1"/>
             </a:ext>
           </a:extLst>
         </p:spPr>
@@ -23989,7 +23989,7 @@
           </a:ln>
           <a:extLst>
             <a:ext uri="{C572A759-6A51-4108-AA02-DFA0A04FC94B}">
-              <ma14:wrappingTextBoxFlag xmlns="" xmlns:ma14="http://schemas.microsoft.com/office/mac/drawingml/2011/main" val="1"/>
+              <ma14:wrappingTextBoxFlag xmlns:ma14="http://schemas.microsoft.com/office/mac/drawingml/2011/main" val="1"/>
             </a:ext>
           </a:extLst>
         </p:spPr>
@@ -24075,7 +24075,7 @@
           </a:ln>
           <a:extLst>
             <a:ext uri="{C572A759-6A51-4108-AA02-DFA0A04FC94B}">
-              <ma14:wrappingTextBoxFlag xmlns="" xmlns:ma14="http://schemas.microsoft.com/office/mac/drawingml/2011/main" val="1"/>
+              <ma14:wrappingTextBoxFlag xmlns:ma14="http://schemas.microsoft.com/office/mac/drawingml/2011/main" val="1"/>
             </a:ext>
           </a:extLst>
         </p:spPr>
@@ -24200,7 +24200,7 @@
           </a:ln>
           <a:extLst>
             <a:ext uri="{C572A759-6A51-4108-AA02-DFA0A04FC94B}">
-              <ma14:wrappingTextBoxFlag xmlns="" xmlns:ma14="http://schemas.microsoft.com/office/mac/drawingml/2011/main" val="1"/>
+              <ma14:wrappingTextBoxFlag xmlns:ma14="http://schemas.microsoft.com/office/mac/drawingml/2011/main" val="1"/>
             </a:ext>
           </a:extLst>
         </p:spPr>
@@ -24417,7 +24417,7 @@
           </a:ln>
           <a:extLst>
             <a:ext uri="{C572A759-6A51-4108-AA02-DFA0A04FC94B}">
-              <ma14:wrappingTextBoxFlag xmlns="" xmlns:ma14="http://schemas.microsoft.com/office/mac/drawingml/2011/main" val="1"/>
+              <ma14:wrappingTextBoxFlag xmlns:ma14="http://schemas.microsoft.com/office/mac/drawingml/2011/main" val="1"/>
             </a:ext>
           </a:extLst>
         </p:spPr>
@@ -24655,7 +24655,7 @@
           </a:ln>
           <a:extLst>
             <a:ext uri="{C572A759-6A51-4108-AA02-DFA0A04FC94B}">
-              <ma14:wrappingTextBoxFlag xmlns="" xmlns:ma14="http://schemas.microsoft.com/office/mac/drawingml/2011/main" val="1"/>
+              <ma14:wrappingTextBoxFlag xmlns:ma14="http://schemas.microsoft.com/office/mac/drawingml/2011/main" val="1"/>
             </a:ext>
           </a:extLst>
         </p:spPr>
@@ -24703,7 +24703,7 @@
           </a:ln>
           <a:extLst>
             <a:ext uri="{C572A759-6A51-4108-AA02-DFA0A04FC94B}">
-              <ma14:wrappingTextBoxFlag xmlns="" xmlns:ma14="http://schemas.microsoft.com/office/mac/drawingml/2011/main" val="1"/>
+              <ma14:wrappingTextBoxFlag xmlns:ma14="http://schemas.microsoft.com/office/mac/drawingml/2011/main" val="1"/>
             </a:ext>
           </a:extLst>
         </p:spPr>
@@ -24763,7 +24763,7 @@
           </a:ln>
           <a:extLst>
             <a:ext uri="{C572A759-6A51-4108-AA02-DFA0A04FC94B}">
-              <ma14:wrappingTextBoxFlag xmlns="" xmlns:ma14="http://schemas.microsoft.com/office/mac/drawingml/2011/main" val="1"/>
+              <ma14:wrappingTextBoxFlag xmlns:ma14="http://schemas.microsoft.com/office/mac/drawingml/2011/main" val="1"/>
             </a:ext>
           </a:extLst>
         </p:spPr>
@@ -24989,7 +24989,7 @@
           </a:ln>
           <a:extLst>
             <a:ext uri="{C572A759-6A51-4108-AA02-DFA0A04FC94B}">
-              <ma14:wrappingTextBoxFlag xmlns="" xmlns:ma14="http://schemas.microsoft.com/office/mac/drawingml/2011/main" val="1"/>
+              <ma14:wrappingTextBoxFlag xmlns:ma14="http://schemas.microsoft.com/office/mac/drawingml/2011/main" val="1"/>
             </a:ext>
           </a:extLst>
         </p:spPr>
@@ -25116,7 +25116,7 @@
           </a:ln>
           <a:extLst>
             <a:ext uri="{C572A759-6A51-4108-AA02-DFA0A04FC94B}">
-              <ma14:wrappingTextBoxFlag xmlns="" xmlns:ma14="http://schemas.microsoft.com/office/mac/drawingml/2011/main" val="1"/>
+              <ma14:wrappingTextBoxFlag xmlns:ma14="http://schemas.microsoft.com/office/mac/drawingml/2011/main" val="1"/>
             </a:ext>
           </a:extLst>
         </p:spPr>
@@ -25212,7 +25212,7 @@
           </a:ln>
           <a:extLst>
             <a:ext uri="{C572A759-6A51-4108-AA02-DFA0A04FC94B}">
-              <ma14:wrappingTextBoxFlag xmlns="" xmlns:ma14="http://schemas.microsoft.com/office/mac/drawingml/2011/main" val="1"/>
+              <ma14:wrappingTextBoxFlag xmlns:ma14="http://schemas.microsoft.com/office/mac/drawingml/2011/main" val="1"/>
             </a:ext>
           </a:extLst>
         </p:spPr>
@@ -25337,7 +25337,7 @@
           </a:ln>
           <a:extLst>
             <a:ext uri="{C572A759-6A51-4108-AA02-DFA0A04FC94B}">
-              <ma14:wrappingTextBoxFlag xmlns="" xmlns:ma14="http://schemas.microsoft.com/office/mac/drawingml/2011/main" val="1"/>
+              <ma14:wrappingTextBoxFlag xmlns:ma14="http://schemas.microsoft.com/office/mac/drawingml/2011/main" val="1"/>
             </a:ext>
           </a:extLst>
         </p:spPr>
@@ -25442,7 +25442,7 @@
           </a:ln>
           <a:extLst>
             <a:ext uri="{C572A759-6A51-4108-AA02-DFA0A04FC94B}">
-              <ma14:wrappingTextBoxFlag xmlns="" xmlns:ma14="http://schemas.microsoft.com/office/mac/drawingml/2011/main" val="1"/>
+              <ma14:wrappingTextBoxFlag xmlns:ma14="http://schemas.microsoft.com/office/mac/drawingml/2011/main" val="1"/>
             </a:ext>
           </a:extLst>
         </p:spPr>
@@ -25617,7 +25617,7 @@
           </a:ln>
           <a:extLst>
             <a:ext uri="{C572A759-6A51-4108-AA02-DFA0A04FC94B}">
-              <ma14:wrappingTextBoxFlag xmlns="" xmlns:ma14="http://schemas.microsoft.com/office/mac/drawingml/2011/main" val="1"/>
+              <ma14:wrappingTextBoxFlag xmlns:ma14="http://schemas.microsoft.com/office/mac/drawingml/2011/main" val="1"/>
             </a:ext>
           </a:extLst>
         </p:spPr>
@@ -27393,7 +27393,7 @@
           </a:ln>
           <a:extLst>
             <a:ext uri="{C572A759-6A51-4108-AA02-DFA0A04FC94B}">
-              <ma14:wrappingTextBoxFlag xmlns="" xmlns:ma14="http://schemas.microsoft.com/office/mac/drawingml/2011/main" val="1"/>
+              <ma14:wrappingTextBoxFlag xmlns:ma14="http://schemas.microsoft.com/office/mac/drawingml/2011/main" val="1"/>
             </a:ext>
           </a:extLst>
         </p:spPr>
@@ -27623,7 +27623,7 @@
           </a:ln>
           <a:extLst>
             <a:ext uri="{C572A759-6A51-4108-AA02-DFA0A04FC94B}">
-              <ma14:wrappingTextBoxFlag xmlns="" xmlns:ma14="http://schemas.microsoft.com/office/mac/drawingml/2011/main" val="1"/>
+              <ma14:wrappingTextBoxFlag xmlns:ma14="http://schemas.microsoft.com/office/mac/drawingml/2011/main" val="1"/>
             </a:ext>
           </a:extLst>
         </p:spPr>
@@ -27760,7 +27760,7 @@
           </a:ln>
           <a:extLst>
             <a:ext uri="{C572A759-6A51-4108-AA02-DFA0A04FC94B}">
-              <ma14:wrappingTextBoxFlag xmlns="" xmlns:ma14="http://schemas.microsoft.com/office/mac/drawingml/2011/main" val="1"/>
+              <ma14:wrappingTextBoxFlag xmlns:ma14="http://schemas.microsoft.com/office/mac/drawingml/2011/main" val="1"/>
             </a:ext>
           </a:extLst>
         </p:spPr>
@@ -27857,7 +27857,7 @@
           </a:ln>
           <a:extLst>
             <a:ext uri="{C572A759-6A51-4108-AA02-DFA0A04FC94B}">
-              <ma14:wrappingTextBoxFlag xmlns="" xmlns:ma14="http://schemas.microsoft.com/office/mac/drawingml/2011/main" val="1"/>
+              <ma14:wrappingTextBoxFlag xmlns:ma14="http://schemas.microsoft.com/office/mac/drawingml/2011/main" val="1"/>
             </a:ext>
           </a:extLst>
         </p:spPr>
@@ -27995,7 +27995,7 @@
           </a:ln>
           <a:extLst>
             <a:ext uri="{C572A759-6A51-4108-AA02-DFA0A04FC94B}">
-              <ma14:wrappingTextBoxFlag xmlns="" xmlns:ma14="http://schemas.microsoft.com/office/mac/drawingml/2011/main" val="1"/>
+              <ma14:wrappingTextBoxFlag xmlns:ma14="http://schemas.microsoft.com/office/mac/drawingml/2011/main" val="1"/>
             </a:ext>
           </a:extLst>
         </p:spPr>
@@ -28345,7 +28345,7 @@
           </a:ln>
           <a:extLst>
             <a:ext uri="{C572A759-6A51-4108-AA02-DFA0A04FC94B}">
-              <ma14:wrappingTextBoxFlag xmlns="" xmlns:ma14="http://schemas.microsoft.com/office/mac/drawingml/2011/main" val="1"/>
+              <ma14:wrappingTextBoxFlag xmlns:ma14="http://schemas.microsoft.com/office/mac/drawingml/2011/main" val="1"/>
             </a:ext>
           </a:extLst>
         </p:spPr>
@@ -28667,7 +28667,7 @@
           </a:ln>
           <a:extLst>
             <a:ext uri="{C572A759-6A51-4108-AA02-DFA0A04FC94B}">
-              <ma14:wrappingTextBoxFlag xmlns="" xmlns:ma14="http://schemas.microsoft.com/office/mac/drawingml/2011/main" val="1"/>
+              <ma14:wrappingTextBoxFlag xmlns:ma14="http://schemas.microsoft.com/office/mac/drawingml/2011/main" val="1"/>
             </a:ext>
           </a:extLst>
         </p:spPr>
@@ -28794,7 +28794,7 @@
           </a:ln>
           <a:extLst>
             <a:ext uri="{C572A759-6A51-4108-AA02-DFA0A04FC94B}">
-              <ma14:wrappingTextBoxFlag xmlns="" xmlns:ma14="http://schemas.microsoft.com/office/mac/drawingml/2011/main" val="1"/>
+              <ma14:wrappingTextBoxFlag xmlns:ma14="http://schemas.microsoft.com/office/mac/drawingml/2011/main" val="1"/>
             </a:ext>
           </a:extLst>
         </p:spPr>
@@ -29156,7 +29156,7 @@
           </a:ln>
           <a:extLst>
             <a:ext uri="{C572A759-6A51-4108-AA02-DFA0A04FC94B}">
-              <ma14:wrappingTextBoxFlag xmlns="" xmlns:ma14="http://schemas.microsoft.com/office/mac/drawingml/2011/main" val="1"/>
+              <ma14:wrappingTextBoxFlag xmlns:ma14="http://schemas.microsoft.com/office/mac/drawingml/2011/main" val="1"/>
             </a:ext>
           </a:extLst>
         </p:spPr>
@@ -29204,7 +29204,7 @@
           </a:ln>
           <a:extLst>
             <a:ext uri="{C572A759-6A51-4108-AA02-DFA0A04FC94B}">
-              <ma14:wrappingTextBoxFlag xmlns="" xmlns:ma14="http://schemas.microsoft.com/office/mac/drawingml/2011/main" val="1"/>
+              <ma14:wrappingTextBoxFlag xmlns:ma14="http://schemas.microsoft.com/office/mac/drawingml/2011/main" val="1"/>
             </a:ext>
           </a:extLst>
         </p:spPr>
@@ -29261,7 +29261,7 @@
           </a:ln>
           <a:extLst>
             <a:ext uri="{C572A759-6A51-4108-AA02-DFA0A04FC94B}">
-              <ma14:wrappingTextBoxFlag xmlns="" xmlns:ma14="http://schemas.microsoft.com/office/mac/drawingml/2011/main" val="1"/>
+              <ma14:wrappingTextBoxFlag xmlns:ma14="http://schemas.microsoft.com/office/mac/drawingml/2011/main" val="1"/>
             </a:ext>
           </a:extLst>
         </p:spPr>

</xml_diff>